<commit_message>
3 coil major revision
</commit_message>
<xml_diff>
--- a/WPT/3-coil/Three-Coil-Journal/winding/New Microsoft PowerPoint Presentation.pptx
+++ b/WPT/3-coil/Three-Coil-Journal/winding/New Microsoft PowerPoint Presentation.pptx
@@ -6,6 +6,8 @@
   </p:sldMasterIdLst>
   <p:sldIdLst>
     <p:sldId id="256" r:id="rId2"/>
+    <p:sldId id="257" r:id="rId3"/>
+    <p:sldId id="258" r:id="rId4"/>
   </p:sldIdLst>
   <p:sldSz cx="12192000" cy="6858000"/>
   <p:notesSz cx="6858000" cy="9144000"/>
@@ -104,6 +106,11 @@
       </a:defRPr>
     </a:lvl9pPr>
   </p:defaultTextStyle>
+  <p:extLst>
+    <p:ext uri="{EFAFB233-063F-42B5-8137-9DF3F51BA10A}">
+      <p15:sldGuideLst xmlns:p15="http://schemas.microsoft.com/office/powerpoint/2012/main"/>
+    </p:ext>
+  </p:extLst>
 </p:presentation>
 </file>
 
@@ -254,7 +261,7 @@
           <a:p>
             <a:fld id="{AF167F7D-BA7B-4510-8995-2B98A2CF80B0}" type="datetimeFigureOut">
               <a:rPr lang="en-US" smtClean="0"/>
-              <a:t>5/30/2022</a:t>
+              <a:t>6/11/2022</a:t>
             </a:fld>
             <a:endParaRPr lang="en-US"/>
           </a:p>
@@ -452,7 +459,7 @@
           <a:p>
             <a:fld id="{AF167F7D-BA7B-4510-8995-2B98A2CF80B0}" type="datetimeFigureOut">
               <a:rPr lang="en-US" smtClean="0"/>
-              <a:t>5/30/2022</a:t>
+              <a:t>6/11/2022</a:t>
             </a:fld>
             <a:endParaRPr lang="en-US"/>
           </a:p>
@@ -660,7 +667,7 @@
           <a:p>
             <a:fld id="{AF167F7D-BA7B-4510-8995-2B98A2CF80B0}" type="datetimeFigureOut">
               <a:rPr lang="en-US" smtClean="0"/>
-              <a:t>5/30/2022</a:t>
+              <a:t>6/11/2022</a:t>
             </a:fld>
             <a:endParaRPr lang="en-US"/>
           </a:p>
@@ -858,7 +865,7 @@
           <a:p>
             <a:fld id="{AF167F7D-BA7B-4510-8995-2B98A2CF80B0}" type="datetimeFigureOut">
               <a:rPr lang="en-US" smtClean="0"/>
-              <a:t>5/30/2022</a:t>
+              <a:t>6/11/2022</a:t>
             </a:fld>
             <a:endParaRPr lang="en-US"/>
           </a:p>
@@ -1133,7 +1140,7 @@
           <a:p>
             <a:fld id="{AF167F7D-BA7B-4510-8995-2B98A2CF80B0}" type="datetimeFigureOut">
               <a:rPr lang="en-US" smtClean="0"/>
-              <a:t>5/30/2022</a:t>
+              <a:t>6/11/2022</a:t>
             </a:fld>
             <a:endParaRPr lang="en-US"/>
           </a:p>
@@ -1398,7 +1405,7 @@
           <a:p>
             <a:fld id="{AF167F7D-BA7B-4510-8995-2B98A2CF80B0}" type="datetimeFigureOut">
               <a:rPr lang="en-US" smtClean="0"/>
-              <a:t>5/30/2022</a:t>
+              <a:t>6/11/2022</a:t>
             </a:fld>
             <a:endParaRPr lang="en-US"/>
           </a:p>
@@ -1810,7 +1817,7 @@
           <a:p>
             <a:fld id="{AF167F7D-BA7B-4510-8995-2B98A2CF80B0}" type="datetimeFigureOut">
               <a:rPr lang="en-US" smtClean="0"/>
-              <a:t>5/30/2022</a:t>
+              <a:t>6/11/2022</a:t>
             </a:fld>
             <a:endParaRPr lang="en-US"/>
           </a:p>
@@ -1951,7 +1958,7 @@
           <a:p>
             <a:fld id="{AF167F7D-BA7B-4510-8995-2B98A2CF80B0}" type="datetimeFigureOut">
               <a:rPr lang="en-US" smtClean="0"/>
-              <a:t>5/30/2022</a:t>
+              <a:t>6/11/2022</a:t>
             </a:fld>
             <a:endParaRPr lang="en-US"/>
           </a:p>
@@ -2064,7 +2071,7 @@
           <a:p>
             <a:fld id="{AF167F7D-BA7B-4510-8995-2B98A2CF80B0}" type="datetimeFigureOut">
               <a:rPr lang="en-US" smtClean="0"/>
-              <a:t>5/30/2022</a:t>
+              <a:t>6/11/2022</a:t>
             </a:fld>
             <a:endParaRPr lang="en-US"/>
           </a:p>
@@ -2375,7 +2382,7 @@
           <a:p>
             <a:fld id="{AF167F7D-BA7B-4510-8995-2B98A2CF80B0}" type="datetimeFigureOut">
               <a:rPr lang="en-US" smtClean="0"/>
-              <a:t>5/30/2022</a:t>
+              <a:t>6/11/2022</a:t>
             </a:fld>
             <a:endParaRPr lang="en-US"/>
           </a:p>
@@ -2663,7 +2670,7 @@
           <a:p>
             <a:fld id="{AF167F7D-BA7B-4510-8995-2B98A2CF80B0}" type="datetimeFigureOut">
               <a:rPr lang="en-US" smtClean="0"/>
-              <a:t>5/30/2022</a:t>
+              <a:t>6/11/2022</a:t>
             </a:fld>
             <a:endParaRPr lang="en-US"/>
           </a:p>
@@ -2904,7 +2911,7 @@
           <a:p>
             <a:fld id="{AF167F7D-BA7B-4510-8995-2B98A2CF80B0}" type="datetimeFigureOut">
               <a:rPr lang="en-US" smtClean="0"/>
-              <a:t>5/30/2022</a:t>
+              <a:t>6/11/2022</a:t>
             </a:fld>
             <a:endParaRPr lang="en-US"/>
           </a:p>
@@ -4028,6 +4035,732 @@
 </p:sld>
 </file>
 
+<file path=ppt/slides/slide2.xml><?xml version="1.0" encoding="utf-8"?>
+<p:sld xmlns:a="http://schemas.openxmlformats.org/drawingml/2006/main" xmlns:r="http://schemas.openxmlformats.org/officeDocument/2006/relationships" xmlns:p="http://schemas.openxmlformats.org/presentationml/2006/main">
+  <p:cSld>
+    <p:spTree>
+      <p:nvGrpSpPr>
+        <p:cNvPr id="1" name=""/>
+        <p:cNvGrpSpPr/>
+        <p:nvPr/>
+      </p:nvGrpSpPr>
+      <p:grpSpPr>
+        <a:xfrm>
+          <a:off x="0" y="0"/>
+          <a:ext cx="0" cy="0"/>
+          <a:chOff x="0" y="0"/>
+          <a:chExt cx="0" cy="0"/>
+        </a:xfrm>
+      </p:grpSpPr>
+      <p:pic>
+        <p:nvPicPr>
+          <p:cNvPr id="10" name="Picture 9">
+            <a:extLst>
+              <a:ext uri="{FF2B5EF4-FFF2-40B4-BE49-F238E27FC236}">
+                <a16:creationId xmlns:a16="http://schemas.microsoft.com/office/drawing/2014/main" id="{B3388D58-1962-413B-8AAB-C1805F90CDEC}"/>
+              </a:ext>
+            </a:extLst>
+          </p:cNvPr>
+          <p:cNvPicPr>
+            <a:picLocks noChangeAspect="1"/>
+          </p:cNvPicPr>
+          <p:nvPr/>
+        </p:nvPicPr>
+        <p:blipFill rotWithShape="1">
+          <a:blip r:embed="rId2"/>
+          <a:srcRect l="3381" t="20621" r="3989" b="20621"/>
+          <a:stretch/>
+        </p:blipFill>
+        <p:spPr>
+          <a:xfrm>
+            <a:off x="1168400" y="960205"/>
+            <a:ext cx="9855200" cy="3464390"/>
+          </a:xfrm>
+          <a:prstGeom prst="rect">
+            <a:avLst/>
+          </a:prstGeom>
+        </p:spPr>
+      </p:pic>
+      <p:pic>
+        <p:nvPicPr>
+          <p:cNvPr id="6" name="Picture 5">
+            <a:extLst>
+              <a:ext uri="{FF2B5EF4-FFF2-40B4-BE49-F238E27FC236}">
+                <a16:creationId xmlns:a16="http://schemas.microsoft.com/office/drawing/2014/main" id="{C716196F-6296-43D1-92F9-2DCC1DB55112}"/>
+              </a:ext>
+            </a:extLst>
+          </p:cNvPr>
+          <p:cNvPicPr>
+            <a:picLocks noChangeAspect="1"/>
+          </p:cNvPicPr>
+          <p:nvPr/>
+        </p:nvPicPr>
+        <p:blipFill rotWithShape="1">
+          <a:blip r:embed="rId3"/>
+          <a:srcRect t="77846" r="88927" b="6264"/>
+          <a:stretch/>
+        </p:blipFill>
+        <p:spPr>
+          <a:xfrm>
+            <a:off x="9743870" y="3548850"/>
+            <a:ext cx="1178130" cy="936891"/>
+          </a:xfrm>
+          <a:prstGeom prst="rect">
+            <a:avLst/>
+          </a:prstGeom>
+        </p:spPr>
+      </p:pic>
+      <p:cxnSp>
+        <p:nvCxnSpPr>
+          <p:cNvPr id="7" name="Straight Arrow Connector 6">
+            <a:extLst>
+              <a:ext uri="{FF2B5EF4-FFF2-40B4-BE49-F238E27FC236}">
+                <a16:creationId xmlns:a16="http://schemas.microsoft.com/office/drawing/2014/main" id="{B5FCE45D-66E0-4180-BBAC-E300437CF182}"/>
+              </a:ext>
+            </a:extLst>
+          </p:cNvPr>
+          <p:cNvCxnSpPr>
+            <a:cxnSpLocks/>
+          </p:cNvCxnSpPr>
+          <p:nvPr/>
+        </p:nvCxnSpPr>
+        <p:spPr>
+          <a:xfrm flipV="1">
+            <a:off x="6118628" y="4282185"/>
+            <a:ext cx="0" cy="241470"/>
+          </a:xfrm>
+          <a:prstGeom prst="straightConnector1">
+            <a:avLst/>
+          </a:prstGeom>
+          <a:ln>
+            <a:solidFill>
+              <a:schemeClr val="tx1"/>
+            </a:solidFill>
+            <a:tailEnd type="triangle"/>
+          </a:ln>
+        </p:spPr>
+        <p:style>
+          <a:lnRef idx="1">
+            <a:schemeClr val="accent1"/>
+          </a:lnRef>
+          <a:fillRef idx="0">
+            <a:schemeClr val="accent1"/>
+          </a:fillRef>
+          <a:effectRef idx="0">
+            <a:schemeClr val="accent1"/>
+          </a:effectRef>
+          <a:fontRef idx="minor">
+            <a:schemeClr val="tx1"/>
+          </a:fontRef>
+        </p:style>
+      </p:cxnSp>
+      <p:sp>
+        <p:nvSpPr>
+          <p:cNvPr id="13" name="TextBox 12">
+            <a:extLst>
+              <a:ext uri="{FF2B5EF4-FFF2-40B4-BE49-F238E27FC236}">
+                <a16:creationId xmlns:a16="http://schemas.microsoft.com/office/drawing/2014/main" id="{839FA0F3-85CA-4FAD-B7F0-4D97E0DECE72}"/>
+              </a:ext>
+            </a:extLst>
+          </p:cNvPr>
+          <p:cNvSpPr txBox="1"/>
+          <p:nvPr/>
+        </p:nvSpPr>
+        <p:spPr>
+          <a:xfrm>
+            <a:off x="3286844" y="3431309"/>
+            <a:ext cx="1000125" cy="369332"/>
+          </a:xfrm>
+          <a:prstGeom prst="rect">
+            <a:avLst/>
+          </a:prstGeom>
+          <a:noFill/>
+        </p:spPr>
+        <p:txBody>
+          <a:bodyPr wrap="square" rtlCol="0">
+            <a:spAutoFit/>
+          </a:bodyPr>
+          <a:lstStyle/>
+          <a:p>
+            <a:pPr algn="r"/>
+            <a:r>
+              <a:rPr lang="en-US" dirty="0">
+                <a:solidFill>
+                  <a:srgbClr val="FF0000"/>
+                </a:solidFill>
+                <a:latin typeface="Times New Roman" panose="02020603050405020304" pitchFamily="18" charset="0"/>
+                <a:cs typeface="Times New Roman" panose="02020603050405020304" pitchFamily="18" charset="0"/>
+              </a:rPr>
+              <a:t>Tx</a:t>
+            </a:r>
+            <a:r>
+              <a:rPr lang="en-US" sz="1200" dirty="0">
+                <a:solidFill>
+                  <a:srgbClr val="FF0000"/>
+                </a:solidFill>
+                <a:latin typeface="Times New Roman" panose="02020603050405020304" pitchFamily="18" charset="0"/>
+                <a:cs typeface="Times New Roman" panose="02020603050405020304" pitchFamily="18" charset="0"/>
+              </a:rPr>
+              <a:t>1</a:t>
+            </a:r>
+          </a:p>
+        </p:txBody>
+      </p:sp>
+      <p:sp>
+        <p:nvSpPr>
+          <p:cNvPr id="14" name="TextBox 13">
+            <a:extLst>
+              <a:ext uri="{FF2B5EF4-FFF2-40B4-BE49-F238E27FC236}">
+                <a16:creationId xmlns:a16="http://schemas.microsoft.com/office/drawing/2014/main" id="{B22C6AA8-4077-4B75-93DF-B4704D96D902}"/>
+              </a:ext>
+            </a:extLst>
+          </p:cNvPr>
+          <p:cNvSpPr txBox="1"/>
+          <p:nvPr/>
+        </p:nvSpPr>
+        <p:spPr>
+          <a:xfrm>
+            <a:off x="7695909" y="3429000"/>
+            <a:ext cx="1000125" cy="369332"/>
+          </a:xfrm>
+          <a:prstGeom prst="rect">
+            <a:avLst/>
+          </a:prstGeom>
+          <a:noFill/>
+        </p:spPr>
+        <p:txBody>
+          <a:bodyPr wrap="square" rtlCol="0">
+            <a:spAutoFit/>
+          </a:bodyPr>
+          <a:lstStyle/>
+          <a:p>
+            <a:pPr algn="r"/>
+            <a:r>
+              <a:rPr lang="en-US" dirty="0">
+                <a:solidFill>
+                  <a:srgbClr val="FF0000"/>
+                </a:solidFill>
+                <a:latin typeface="Times New Roman" panose="02020603050405020304" pitchFamily="18" charset="0"/>
+                <a:cs typeface="Times New Roman" panose="02020603050405020304" pitchFamily="18" charset="0"/>
+              </a:rPr>
+              <a:t>Tx</a:t>
+            </a:r>
+            <a:r>
+              <a:rPr lang="en-US" sz="1200" dirty="0">
+                <a:solidFill>
+                  <a:srgbClr val="FF0000"/>
+                </a:solidFill>
+                <a:latin typeface="Times New Roman" panose="02020603050405020304" pitchFamily="18" charset="0"/>
+                <a:cs typeface="Times New Roman" panose="02020603050405020304" pitchFamily="18" charset="0"/>
+              </a:rPr>
+              <a:t>2</a:t>
+            </a:r>
+          </a:p>
+        </p:txBody>
+      </p:sp>
+      <p:sp>
+        <p:nvSpPr>
+          <p:cNvPr id="15" name="TextBox 14">
+            <a:extLst>
+              <a:ext uri="{FF2B5EF4-FFF2-40B4-BE49-F238E27FC236}">
+                <a16:creationId xmlns:a16="http://schemas.microsoft.com/office/drawing/2014/main" id="{A5619489-9748-4C55-8AAC-CC129B8BF0C3}"/>
+              </a:ext>
+            </a:extLst>
+          </p:cNvPr>
+          <p:cNvSpPr txBox="1"/>
+          <p:nvPr/>
+        </p:nvSpPr>
+        <p:spPr>
+          <a:xfrm>
+            <a:off x="5496789" y="1879671"/>
+            <a:ext cx="1000125" cy="369332"/>
+          </a:xfrm>
+          <a:prstGeom prst="rect">
+            <a:avLst/>
+          </a:prstGeom>
+          <a:noFill/>
+        </p:spPr>
+        <p:txBody>
+          <a:bodyPr wrap="square" rtlCol="0">
+            <a:spAutoFit/>
+          </a:bodyPr>
+          <a:lstStyle/>
+          <a:p>
+            <a:pPr algn="r"/>
+            <a:r>
+              <a:rPr lang="en-US" dirty="0">
+                <a:solidFill>
+                  <a:srgbClr val="66FFFF"/>
+                </a:solidFill>
+                <a:latin typeface="Times New Roman" panose="02020603050405020304" pitchFamily="18" charset="0"/>
+                <a:cs typeface="Times New Roman" panose="02020603050405020304" pitchFamily="18" charset="0"/>
+              </a:rPr>
+              <a:t>MSR</a:t>
+            </a:r>
+            <a:endParaRPr lang="en-US" sz="1200" dirty="0">
+              <a:solidFill>
+                <a:srgbClr val="66FFFF"/>
+              </a:solidFill>
+              <a:latin typeface="Times New Roman" panose="02020603050405020304" pitchFamily="18" charset="0"/>
+              <a:cs typeface="Times New Roman" panose="02020603050405020304" pitchFamily="18" charset="0"/>
+            </a:endParaRPr>
+          </a:p>
+        </p:txBody>
+      </p:sp>
+      <p:sp>
+        <p:nvSpPr>
+          <p:cNvPr id="16" name="TextBox 15">
+            <a:extLst>
+              <a:ext uri="{FF2B5EF4-FFF2-40B4-BE49-F238E27FC236}">
+                <a16:creationId xmlns:a16="http://schemas.microsoft.com/office/drawing/2014/main" id="{A6FD5C76-329F-4374-99CB-DD365D929954}"/>
+              </a:ext>
+            </a:extLst>
+          </p:cNvPr>
+          <p:cNvSpPr txBox="1"/>
+          <p:nvPr/>
+        </p:nvSpPr>
+        <p:spPr>
+          <a:xfrm>
+            <a:off x="5517372" y="2747575"/>
+            <a:ext cx="1000125" cy="369332"/>
+          </a:xfrm>
+          <a:prstGeom prst="rect">
+            <a:avLst/>
+          </a:prstGeom>
+          <a:noFill/>
+        </p:spPr>
+        <p:txBody>
+          <a:bodyPr wrap="square" rtlCol="0">
+            <a:spAutoFit/>
+          </a:bodyPr>
+          <a:lstStyle/>
+          <a:p>
+            <a:pPr algn="r"/>
+            <a:r>
+              <a:rPr lang="en-US" dirty="0">
+                <a:solidFill>
+                  <a:srgbClr val="66FFFF"/>
+                </a:solidFill>
+                <a:latin typeface="Times New Roman" panose="02020603050405020304" pitchFamily="18" charset="0"/>
+                <a:cs typeface="Times New Roman" panose="02020603050405020304" pitchFamily="18" charset="0"/>
+              </a:rPr>
+              <a:t>MSR</a:t>
+            </a:r>
+            <a:endParaRPr lang="en-US" sz="1200" dirty="0">
+              <a:solidFill>
+                <a:srgbClr val="66FFFF"/>
+              </a:solidFill>
+              <a:latin typeface="Times New Roman" panose="02020603050405020304" pitchFamily="18" charset="0"/>
+              <a:cs typeface="Times New Roman" panose="02020603050405020304" pitchFamily="18" charset="0"/>
+            </a:endParaRPr>
+          </a:p>
+        </p:txBody>
+      </p:sp>
+      <p:cxnSp>
+        <p:nvCxnSpPr>
+          <p:cNvPr id="17" name="Straight Arrow Connector 16">
+            <a:extLst>
+              <a:ext uri="{FF2B5EF4-FFF2-40B4-BE49-F238E27FC236}">
+                <a16:creationId xmlns:a16="http://schemas.microsoft.com/office/drawing/2014/main" id="{793D82E0-B5B1-44F1-A346-3B146461316F}"/>
+              </a:ext>
+            </a:extLst>
+          </p:cNvPr>
+          <p:cNvCxnSpPr>
+            <a:cxnSpLocks/>
+          </p:cNvCxnSpPr>
+          <p:nvPr/>
+        </p:nvCxnSpPr>
+        <p:spPr>
+          <a:xfrm flipV="1">
+            <a:off x="4913283" y="2534507"/>
+            <a:ext cx="0" cy="426136"/>
+          </a:xfrm>
+          <a:prstGeom prst="straightConnector1">
+            <a:avLst/>
+          </a:prstGeom>
+          <a:ln>
+            <a:solidFill>
+              <a:schemeClr val="tx1"/>
+            </a:solidFill>
+            <a:tailEnd type="triangle"/>
+          </a:ln>
+        </p:spPr>
+        <p:style>
+          <a:lnRef idx="1">
+            <a:schemeClr val="accent1"/>
+          </a:lnRef>
+          <a:fillRef idx="0">
+            <a:schemeClr val="accent1"/>
+          </a:fillRef>
+          <a:effectRef idx="0">
+            <a:schemeClr val="accent1"/>
+          </a:effectRef>
+          <a:fontRef idx="minor">
+            <a:schemeClr val="tx1"/>
+          </a:fontRef>
+        </p:style>
+      </p:cxnSp>
+      <p:sp>
+        <p:nvSpPr>
+          <p:cNvPr id="19" name="TextBox 18">
+            <a:extLst>
+              <a:ext uri="{FF2B5EF4-FFF2-40B4-BE49-F238E27FC236}">
+                <a16:creationId xmlns:a16="http://schemas.microsoft.com/office/drawing/2014/main" id="{188D57C3-E8B1-4A37-8589-DB7D86ABC762}"/>
+              </a:ext>
+            </a:extLst>
+          </p:cNvPr>
+          <p:cNvSpPr txBox="1"/>
+          <p:nvPr/>
+        </p:nvSpPr>
+        <p:spPr>
+          <a:xfrm>
+            <a:off x="4309195" y="2847662"/>
+            <a:ext cx="1000125" cy="369332"/>
+          </a:xfrm>
+          <a:prstGeom prst="rect">
+            <a:avLst/>
+          </a:prstGeom>
+          <a:noFill/>
+        </p:spPr>
+        <p:txBody>
+          <a:bodyPr wrap="square" rtlCol="0">
+            <a:spAutoFit/>
+          </a:bodyPr>
+          <a:lstStyle/>
+          <a:p>
+            <a:pPr algn="r"/>
+            <a:r>
+              <a:rPr lang="en-US" dirty="0">
+                <a:latin typeface="Times New Roman" panose="02020603050405020304" pitchFamily="18" charset="0"/>
+                <a:cs typeface="Times New Roman" panose="02020603050405020304" pitchFamily="18" charset="0"/>
+              </a:rPr>
+              <a:t>Ferrite</a:t>
+            </a:r>
+            <a:endParaRPr lang="en-US" sz="1200" dirty="0">
+              <a:latin typeface="Times New Roman" panose="02020603050405020304" pitchFamily="18" charset="0"/>
+              <a:cs typeface="Times New Roman" panose="02020603050405020304" pitchFamily="18" charset="0"/>
+            </a:endParaRPr>
+          </a:p>
+        </p:txBody>
+      </p:sp>
+      <p:sp>
+        <p:nvSpPr>
+          <p:cNvPr id="20" name="TextBox 19">
+            <a:extLst>
+              <a:ext uri="{FF2B5EF4-FFF2-40B4-BE49-F238E27FC236}">
+                <a16:creationId xmlns:a16="http://schemas.microsoft.com/office/drawing/2014/main" id="{63B9A4D0-2864-4FD8-B545-DB698BA71B46}"/>
+              </a:ext>
+            </a:extLst>
+          </p:cNvPr>
+          <p:cNvSpPr txBox="1"/>
+          <p:nvPr/>
+        </p:nvSpPr>
+        <p:spPr>
+          <a:xfrm>
+            <a:off x="5517372" y="4485741"/>
+            <a:ext cx="1000125" cy="369332"/>
+          </a:xfrm>
+          <a:prstGeom prst="rect">
+            <a:avLst/>
+          </a:prstGeom>
+          <a:noFill/>
+        </p:spPr>
+        <p:txBody>
+          <a:bodyPr wrap="square" rtlCol="0">
+            <a:spAutoFit/>
+          </a:bodyPr>
+          <a:lstStyle/>
+          <a:p>
+            <a:pPr algn="r"/>
+            <a:r>
+              <a:rPr lang="en-US" dirty="0">
+                <a:latin typeface="Times New Roman" panose="02020603050405020304" pitchFamily="18" charset="0"/>
+                <a:cs typeface="Times New Roman" panose="02020603050405020304" pitchFamily="18" charset="0"/>
+              </a:rPr>
+              <a:t>Ferrite</a:t>
+            </a:r>
+            <a:endParaRPr lang="en-US" sz="1200" dirty="0">
+              <a:latin typeface="Times New Roman" panose="02020603050405020304" pitchFamily="18" charset="0"/>
+              <a:cs typeface="Times New Roman" panose="02020603050405020304" pitchFamily="18" charset="0"/>
+            </a:endParaRPr>
+          </a:p>
+        </p:txBody>
+      </p:sp>
+      <p:sp>
+        <p:nvSpPr>
+          <p:cNvPr id="21" name="TextBox 20">
+            <a:extLst>
+              <a:ext uri="{FF2B5EF4-FFF2-40B4-BE49-F238E27FC236}">
+                <a16:creationId xmlns:a16="http://schemas.microsoft.com/office/drawing/2014/main" id="{E90931C5-7548-4391-B44C-95D3097440CA}"/>
+              </a:ext>
+            </a:extLst>
+          </p:cNvPr>
+          <p:cNvSpPr txBox="1"/>
+          <p:nvPr/>
+        </p:nvSpPr>
+        <p:spPr>
+          <a:xfrm>
+            <a:off x="5517371" y="524747"/>
+            <a:ext cx="1000125" cy="369332"/>
+          </a:xfrm>
+          <a:prstGeom prst="rect">
+            <a:avLst/>
+          </a:prstGeom>
+          <a:noFill/>
+        </p:spPr>
+        <p:txBody>
+          <a:bodyPr wrap="square" rtlCol="0">
+            <a:spAutoFit/>
+          </a:bodyPr>
+          <a:lstStyle/>
+          <a:p>
+            <a:pPr algn="r"/>
+            <a:r>
+              <a:rPr lang="en-US" dirty="0">
+                <a:latin typeface="Times New Roman" panose="02020603050405020304" pitchFamily="18" charset="0"/>
+                <a:cs typeface="Times New Roman" panose="02020603050405020304" pitchFamily="18" charset="0"/>
+              </a:rPr>
+              <a:t>Ferrite</a:t>
+            </a:r>
+            <a:endParaRPr lang="en-US" sz="1200" dirty="0">
+              <a:latin typeface="Times New Roman" panose="02020603050405020304" pitchFamily="18" charset="0"/>
+              <a:cs typeface="Times New Roman" panose="02020603050405020304" pitchFamily="18" charset="0"/>
+            </a:endParaRPr>
+          </a:p>
+        </p:txBody>
+      </p:sp>
+      <p:cxnSp>
+        <p:nvCxnSpPr>
+          <p:cNvPr id="22" name="Straight Arrow Connector 21">
+            <a:extLst>
+              <a:ext uri="{FF2B5EF4-FFF2-40B4-BE49-F238E27FC236}">
+                <a16:creationId xmlns:a16="http://schemas.microsoft.com/office/drawing/2014/main" id="{B7B10A51-C492-4252-A622-EB45CC70B179}"/>
+              </a:ext>
+            </a:extLst>
+          </p:cNvPr>
+          <p:cNvCxnSpPr>
+            <a:cxnSpLocks/>
+          </p:cNvCxnSpPr>
+          <p:nvPr/>
+        </p:nvCxnSpPr>
+        <p:spPr>
+          <a:xfrm>
+            <a:off x="6118628" y="837912"/>
+            <a:ext cx="2914" cy="274636"/>
+          </a:xfrm>
+          <a:prstGeom prst="straightConnector1">
+            <a:avLst/>
+          </a:prstGeom>
+          <a:ln>
+            <a:solidFill>
+              <a:schemeClr val="tx1"/>
+            </a:solidFill>
+            <a:tailEnd type="triangle"/>
+          </a:ln>
+        </p:spPr>
+        <p:style>
+          <a:lnRef idx="1">
+            <a:schemeClr val="accent1"/>
+          </a:lnRef>
+          <a:fillRef idx="0">
+            <a:schemeClr val="accent1"/>
+          </a:fillRef>
+          <a:effectRef idx="0">
+            <a:schemeClr val="accent1"/>
+          </a:effectRef>
+          <a:fontRef idx="minor">
+            <a:schemeClr val="tx1"/>
+          </a:fontRef>
+        </p:style>
+      </p:cxnSp>
+      <p:sp>
+        <p:nvSpPr>
+          <p:cNvPr id="25" name="TextBox 24">
+            <a:extLst>
+              <a:ext uri="{FF2B5EF4-FFF2-40B4-BE49-F238E27FC236}">
+                <a16:creationId xmlns:a16="http://schemas.microsoft.com/office/drawing/2014/main" id="{B5741D22-2F75-474A-B9D0-7B8EEE5A9A12}"/>
+              </a:ext>
+            </a:extLst>
+          </p:cNvPr>
+          <p:cNvSpPr txBox="1"/>
+          <p:nvPr/>
+        </p:nvSpPr>
+        <p:spPr>
+          <a:xfrm>
+            <a:off x="2786782" y="744966"/>
+            <a:ext cx="1000125" cy="369332"/>
+          </a:xfrm>
+          <a:prstGeom prst="rect">
+            <a:avLst/>
+          </a:prstGeom>
+          <a:noFill/>
+        </p:spPr>
+        <p:txBody>
+          <a:bodyPr wrap="square" rtlCol="0">
+            <a:spAutoFit/>
+          </a:bodyPr>
+          <a:lstStyle/>
+          <a:p>
+            <a:pPr algn="r"/>
+            <a:r>
+              <a:rPr lang="en-US" dirty="0">
+                <a:solidFill>
+                  <a:schemeClr val="accent1">
+                    <a:lumMod val="60000"/>
+                    <a:lumOff val="40000"/>
+                  </a:schemeClr>
+                </a:solidFill>
+                <a:latin typeface="Times New Roman" panose="02020603050405020304" pitchFamily="18" charset="0"/>
+                <a:cs typeface="Times New Roman" panose="02020603050405020304" pitchFamily="18" charset="0"/>
+              </a:rPr>
+              <a:t>Rx</a:t>
+            </a:r>
+            <a:r>
+              <a:rPr lang="en-US" sz="1200" dirty="0">
+                <a:solidFill>
+                  <a:schemeClr val="accent1">
+                    <a:lumMod val="60000"/>
+                    <a:lumOff val="40000"/>
+                  </a:schemeClr>
+                </a:solidFill>
+                <a:latin typeface="Times New Roman" panose="02020603050405020304" pitchFamily="18" charset="0"/>
+                <a:cs typeface="Times New Roman" panose="02020603050405020304" pitchFamily="18" charset="0"/>
+              </a:rPr>
+              <a:t>1</a:t>
+            </a:r>
+          </a:p>
+        </p:txBody>
+      </p:sp>
+      <p:sp>
+        <p:nvSpPr>
+          <p:cNvPr id="26" name="TextBox 25">
+            <a:extLst>
+              <a:ext uri="{FF2B5EF4-FFF2-40B4-BE49-F238E27FC236}">
+                <a16:creationId xmlns:a16="http://schemas.microsoft.com/office/drawing/2014/main" id="{0D34EC5F-E34B-4C27-86EB-76BF53E9AFD8}"/>
+              </a:ext>
+            </a:extLst>
+          </p:cNvPr>
+          <p:cNvSpPr txBox="1"/>
+          <p:nvPr/>
+        </p:nvSpPr>
+        <p:spPr>
+          <a:xfrm>
+            <a:off x="8316044" y="775539"/>
+            <a:ext cx="1000125" cy="369332"/>
+          </a:xfrm>
+          <a:prstGeom prst="rect">
+            <a:avLst/>
+          </a:prstGeom>
+          <a:noFill/>
+        </p:spPr>
+        <p:txBody>
+          <a:bodyPr wrap="square" rtlCol="0">
+            <a:spAutoFit/>
+          </a:bodyPr>
+          <a:lstStyle/>
+          <a:p>
+            <a:pPr algn="r"/>
+            <a:r>
+              <a:rPr lang="en-US" dirty="0">
+                <a:solidFill>
+                  <a:schemeClr val="accent1">
+                    <a:lumMod val="60000"/>
+                    <a:lumOff val="40000"/>
+                  </a:schemeClr>
+                </a:solidFill>
+                <a:latin typeface="Times New Roman" panose="02020603050405020304" pitchFamily="18" charset="0"/>
+                <a:cs typeface="Times New Roman" panose="02020603050405020304" pitchFamily="18" charset="0"/>
+              </a:rPr>
+              <a:t>Rx</a:t>
+            </a:r>
+            <a:r>
+              <a:rPr lang="en-US" sz="1200" dirty="0">
+                <a:solidFill>
+                  <a:schemeClr val="accent1">
+                    <a:lumMod val="60000"/>
+                    <a:lumOff val="40000"/>
+                  </a:schemeClr>
+                </a:solidFill>
+                <a:latin typeface="Times New Roman" panose="02020603050405020304" pitchFamily="18" charset="0"/>
+                <a:cs typeface="Times New Roman" panose="02020603050405020304" pitchFamily="18" charset="0"/>
+              </a:rPr>
+              <a:t>2</a:t>
+            </a:r>
+          </a:p>
+        </p:txBody>
+      </p:sp>
+    </p:spTree>
+    <p:extLst>
+      <p:ext uri="{BB962C8B-B14F-4D97-AF65-F5344CB8AC3E}">
+        <p14:creationId xmlns:p14="http://schemas.microsoft.com/office/powerpoint/2010/main" val="2958612827"/>
+      </p:ext>
+    </p:extLst>
+  </p:cSld>
+  <p:clrMapOvr>
+    <a:masterClrMapping/>
+  </p:clrMapOvr>
+</p:sld>
+</file>
+
+<file path=ppt/slides/slide3.xml><?xml version="1.0" encoding="utf-8"?>
+<p:sld xmlns:a="http://schemas.openxmlformats.org/drawingml/2006/main" xmlns:r="http://schemas.openxmlformats.org/officeDocument/2006/relationships" xmlns:p="http://schemas.openxmlformats.org/presentationml/2006/main">
+  <p:cSld>
+    <p:spTree>
+      <p:nvGrpSpPr>
+        <p:cNvPr id="1" name=""/>
+        <p:cNvGrpSpPr/>
+        <p:nvPr/>
+      </p:nvGrpSpPr>
+      <p:grpSpPr>
+        <a:xfrm>
+          <a:off x="0" y="0"/>
+          <a:ext cx="0" cy="0"/>
+          <a:chOff x="0" y="0"/>
+          <a:chExt cx="0" cy="0"/>
+        </a:xfrm>
+      </p:grpSpPr>
+      <p:pic>
+        <p:nvPicPr>
+          <p:cNvPr id="4" name="Picture 3">
+            <a:extLst>
+              <a:ext uri="{FF2B5EF4-FFF2-40B4-BE49-F238E27FC236}">
+                <a16:creationId xmlns:a16="http://schemas.microsoft.com/office/drawing/2014/main" id="{57E6266F-40E2-4DAA-A740-7AC5B10E2061}"/>
+              </a:ext>
+            </a:extLst>
+          </p:cNvPr>
+          <p:cNvPicPr>
+            <a:picLocks noChangeAspect="1"/>
+          </p:cNvPicPr>
+          <p:nvPr/>
+        </p:nvPicPr>
+        <p:blipFill rotWithShape="1">
+          <a:blip r:embed="rId2"/>
+          <a:srcRect t="77846" r="86982"/>
+          <a:stretch/>
+        </p:blipFill>
+        <p:spPr>
+          <a:xfrm>
+            <a:off x="693159" y="4996872"/>
+            <a:ext cx="1385023" cy="1306223"/>
+          </a:xfrm>
+          <a:prstGeom prst="rect">
+            <a:avLst/>
+          </a:prstGeom>
+        </p:spPr>
+      </p:pic>
+    </p:spTree>
+    <p:extLst>
+      <p:ext uri="{BB962C8B-B14F-4D97-AF65-F5344CB8AC3E}">
+        <p14:creationId xmlns:p14="http://schemas.microsoft.com/office/powerpoint/2010/main" val="339638892"/>
+      </p:ext>
+    </p:extLst>
+  </p:cSld>
+  <p:clrMapOvr>
+    <a:masterClrMapping/>
+  </p:clrMapOvr>
+</p:sld>
+</file>
+
 <file path=ppt/theme/theme1.xml><?xml version="1.0" encoding="utf-8"?>
 <a:theme xmlns:a="http://schemas.openxmlformats.org/drawingml/2006/main" name="Office Theme">
   <a:themeElements>

</xml_diff>